<commit_message>
Corrected typos on W1S3 after teaching.
</commit_message>
<xml_diff>
--- a/W1/3. W1S3 final/Code files/Misc/Some_neural_networks_diagrams.pptx
+++ b/W1/3. W1S3 final/Code files/Misc/Some_neural_networks_diagrams.pptx
@@ -117,7 +117,7 @@
 <file path=ppt/revisionInfo.xml><?xml version="1.0" encoding="utf-8"?>
 <p1510:revInfo xmlns:a="http://schemas.openxmlformats.org/drawingml/2006/main" xmlns:r="http://schemas.openxmlformats.org/officeDocument/2006/relationships" xmlns:p1510="http://schemas.microsoft.com/office/powerpoint/2015/10/main">
   <p1510:revLst>
-    <p1510:client id="{23890D2B-5D6C-432C-828D-FBF8CC830F3A}" v="6" dt="2023-01-25T05:27:30.506"/>
+    <p1510:client id="{9F696AC1-3591-4A78-8CFC-3B2CB65F546F}" v="2" dt="2023-01-27T08:38:22.419"/>
   </p1510:revLst>
 </p1510:revInfo>
 </file>
@@ -1289,6 +1289,30 @@
       </pc:sldMasterChg>
     </pc:docChg>
   </pc:docChgLst>
+  <pc:docChgLst>
+    <pc:chgData name="Matthieu De Mari" userId="dfb708c9-d8dc-439f-9a3b-c772bf4a311c" providerId="ADAL" clId="{9F696AC1-3591-4A78-8CFC-3B2CB65F546F}"/>
+    <pc:docChg chg="modSld">
+      <pc:chgData name="Matthieu De Mari" userId="dfb708c9-d8dc-439f-9a3b-c772bf4a311c" providerId="ADAL" clId="{9F696AC1-3591-4A78-8CFC-3B2CB65F546F}" dt="2023-01-27T08:38:22.418" v="1" actId="20577"/>
+      <pc:docMkLst>
+        <pc:docMk/>
+      </pc:docMkLst>
+      <pc:sldChg chg="modSp">
+        <pc:chgData name="Matthieu De Mari" userId="dfb708c9-d8dc-439f-9a3b-c772bf4a311c" providerId="ADAL" clId="{9F696AC1-3591-4A78-8CFC-3B2CB65F546F}" dt="2023-01-27T08:38:22.418" v="1" actId="20577"/>
+        <pc:sldMkLst>
+          <pc:docMk/>
+          <pc:sldMk cId="1641134415" sldId="256"/>
+        </pc:sldMkLst>
+        <pc:spChg chg="mod">
+          <ac:chgData name="Matthieu De Mari" userId="dfb708c9-d8dc-439f-9a3b-c772bf4a311c" providerId="ADAL" clId="{9F696AC1-3591-4A78-8CFC-3B2CB65F546F}" dt="2023-01-27T08:38:22.418" v="1" actId="20577"/>
+          <ac:spMkLst>
+            <pc:docMk/>
+            <pc:sldMk cId="1641134415" sldId="256"/>
+            <ac:spMk id="23" creationId="{CAC05414-2AD2-A15C-E786-DBE3C9760976}"/>
+          </ac:spMkLst>
+        </pc:spChg>
+      </pc:sldChg>
+    </pc:docChg>
+  </pc:docChgLst>
 </pc:chgInfo>
 </file>
 
@@ -1441,7 +1465,7 @@
           <a:p>
             <a:fld id="{A090A5D8-D40D-45B7-B482-7FD296FEC384}" type="datetimeFigureOut">
               <a:rPr lang="en-SG" smtClean="0"/>
-              <a:t>25/1/2023</a:t>
+              <a:t>27/1/2023</a:t>
             </a:fld>
             <a:endParaRPr lang="en-SG"/>
           </a:p>
@@ -1641,7 +1665,7 @@
           <a:p>
             <a:fld id="{A090A5D8-D40D-45B7-B482-7FD296FEC384}" type="datetimeFigureOut">
               <a:rPr lang="en-SG" smtClean="0"/>
-              <a:t>25/1/2023</a:t>
+              <a:t>27/1/2023</a:t>
             </a:fld>
             <a:endParaRPr lang="en-SG"/>
           </a:p>
@@ -1851,7 +1875,7 @@
           <a:p>
             <a:fld id="{A090A5D8-D40D-45B7-B482-7FD296FEC384}" type="datetimeFigureOut">
               <a:rPr lang="en-SG" smtClean="0"/>
-              <a:t>25/1/2023</a:t>
+              <a:t>27/1/2023</a:t>
             </a:fld>
             <a:endParaRPr lang="en-SG"/>
           </a:p>
@@ -2051,7 +2075,7 @@
           <a:p>
             <a:fld id="{A090A5D8-D40D-45B7-B482-7FD296FEC384}" type="datetimeFigureOut">
               <a:rPr lang="en-SG" smtClean="0"/>
-              <a:t>25/1/2023</a:t>
+              <a:t>27/1/2023</a:t>
             </a:fld>
             <a:endParaRPr lang="en-SG"/>
           </a:p>
@@ -2327,7 +2351,7 @@
           <a:p>
             <a:fld id="{A090A5D8-D40D-45B7-B482-7FD296FEC384}" type="datetimeFigureOut">
               <a:rPr lang="en-SG" smtClean="0"/>
-              <a:t>25/1/2023</a:t>
+              <a:t>27/1/2023</a:t>
             </a:fld>
             <a:endParaRPr lang="en-SG"/>
           </a:p>
@@ -2595,7 +2619,7 @@
           <a:p>
             <a:fld id="{A090A5D8-D40D-45B7-B482-7FD296FEC384}" type="datetimeFigureOut">
               <a:rPr lang="en-SG" smtClean="0"/>
-              <a:t>25/1/2023</a:t>
+              <a:t>27/1/2023</a:t>
             </a:fld>
             <a:endParaRPr lang="en-SG"/>
           </a:p>
@@ -3010,7 +3034,7 @@
           <a:p>
             <a:fld id="{A090A5D8-D40D-45B7-B482-7FD296FEC384}" type="datetimeFigureOut">
               <a:rPr lang="en-SG" smtClean="0"/>
-              <a:t>25/1/2023</a:t>
+              <a:t>27/1/2023</a:t>
             </a:fld>
             <a:endParaRPr lang="en-SG"/>
           </a:p>
@@ -3152,7 +3176,7 @@
           <a:p>
             <a:fld id="{A090A5D8-D40D-45B7-B482-7FD296FEC384}" type="datetimeFigureOut">
               <a:rPr lang="en-SG" smtClean="0"/>
-              <a:t>25/1/2023</a:t>
+              <a:t>27/1/2023</a:t>
             </a:fld>
             <a:endParaRPr lang="en-SG"/>
           </a:p>
@@ -3265,7 +3289,7 @@
           <a:p>
             <a:fld id="{A090A5D8-D40D-45B7-B482-7FD296FEC384}" type="datetimeFigureOut">
               <a:rPr lang="en-SG" smtClean="0"/>
-              <a:t>25/1/2023</a:t>
+              <a:t>27/1/2023</a:t>
             </a:fld>
             <a:endParaRPr lang="en-SG"/>
           </a:p>
@@ -3578,7 +3602,7 @@
           <a:p>
             <a:fld id="{A090A5D8-D40D-45B7-B482-7FD296FEC384}" type="datetimeFigureOut">
               <a:rPr lang="en-SG" smtClean="0"/>
-              <a:t>25/1/2023</a:t>
+              <a:t>27/1/2023</a:t>
             </a:fld>
             <a:endParaRPr lang="en-SG"/>
           </a:p>
@@ -3867,7 +3891,7 @@
           <a:p>
             <a:fld id="{A090A5D8-D40D-45B7-B482-7FD296FEC384}" type="datetimeFigureOut">
               <a:rPr lang="en-SG" smtClean="0"/>
-              <a:t>25/1/2023</a:t>
+              <a:t>27/1/2023</a:t>
             </a:fld>
             <a:endParaRPr lang="en-SG"/>
           </a:p>
@@ -4110,7 +4134,7 @@
           <a:p>
             <a:fld id="{A090A5D8-D40D-45B7-B482-7FD296FEC384}" type="datetimeFigureOut">
               <a:rPr lang="en-SG" smtClean="0"/>
-              <a:t>25/1/2023</a:t>
+              <a:t>27/1/2023</a:t>
             </a:fld>
             <a:endParaRPr lang="en-SG"/>
           </a:p>
@@ -5424,8 +5448,8 @@
           </a:fontRef>
         </p:style>
       </p:cxnSp>
-      <mc:AlternateContent xmlns:mc="http://schemas.openxmlformats.org/markup-compatibility/2006" xmlns:a14="http://schemas.microsoft.com/office/drawing/2010/main">
-        <mc:Choice Requires="a14">
+      <mc:AlternateContent xmlns:mc="http://schemas.openxmlformats.org/markup-compatibility/2006">
+        <mc:Choice xmlns:a14="http://schemas.microsoft.com/office/drawing/2010/main" Requires="a14">
           <p:sp>
             <p:nvSpPr>
               <p:cNvPr id="23" name="Oval 22">
@@ -5503,7 +5527,7 @@
                             <a:rPr lang="en-GB" b="0" i="1" smtClean="0">
                               <a:latin typeface="Cambria Math" panose="02040503050406030204" pitchFamily="18" charset="0"/>
                             </a:rPr>
-                            <m:t>1</m:t>
+                            <m:t>𝑖</m:t>
                           </m:r>
                         </m:sub>
                       </m:sSub>
@@ -5515,7 +5539,7 @@
             </p:txBody>
           </p:sp>
         </mc:Choice>
-        <mc:Fallback xmlns="">
+        <mc:Fallback>
           <p:sp>
             <p:nvSpPr>
               <p:cNvPr id="23" name="Oval 22">
@@ -7529,8 +7553,8 @@
           </p:sp>
         </mc:Fallback>
       </mc:AlternateContent>
-      <mc:AlternateContent xmlns:mc="http://schemas.openxmlformats.org/markup-compatibility/2006">
-        <mc:Choice xmlns:a14="http://schemas.microsoft.com/office/drawing/2010/main" Requires="a14">
+      <mc:AlternateContent xmlns:mc="http://schemas.openxmlformats.org/markup-compatibility/2006" xmlns:a14="http://schemas.microsoft.com/office/drawing/2010/main">
+        <mc:Choice Requires="a14">
           <p:sp>
             <p:nvSpPr>
               <p:cNvPr id="40" name="Rectangle: Rounded Corners 39">
@@ -7645,7 +7669,7 @@
             </p:txBody>
           </p:sp>
         </mc:Choice>
-        <mc:Fallback>
+        <mc:Fallback xmlns="">
           <p:sp>
             <p:nvSpPr>
               <p:cNvPr id="40" name="Rectangle: Rounded Corners 39">
@@ -8088,8 +8112,8 @@
           </a:p>
         </p:txBody>
       </p:sp>
-      <mc:AlternateContent xmlns:mc="http://schemas.openxmlformats.org/markup-compatibility/2006">
-        <mc:Choice xmlns:a14="http://schemas.microsoft.com/office/drawing/2010/main" Requires="a14">
+      <mc:AlternateContent xmlns:mc="http://schemas.openxmlformats.org/markup-compatibility/2006" xmlns:a14="http://schemas.microsoft.com/office/drawing/2010/main">
+        <mc:Choice Requires="a14">
           <p:sp>
             <p:nvSpPr>
               <p:cNvPr id="61" name="Rectangle: Rounded Corners 60">
@@ -8229,7 +8253,7 @@
             </p:txBody>
           </p:sp>
         </mc:Choice>
-        <mc:Fallback>
+        <mc:Fallback xmlns="">
           <p:sp>
             <p:nvSpPr>
               <p:cNvPr id="61" name="Rectangle: Rounded Corners 60">
@@ -8283,8 +8307,8 @@
           </p:sp>
         </mc:Fallback>
       </mc:AlternateContent>
-      <mc:AlternateContent xmlns:mc="http://schemas.openxmlformats.org/markup-compatibility/2006">
-        <mc:Choice xmlns:a14="http://schemas.microsoft.com/office/drawing/2010/main" Requires="a14">
+      <mc:AlternateContent xmlns:mc="http://schemas.openxmlformats.org/markup-compatibility/2006" xmlns:a14="http://schemas.microsoft.com/office/drawing/2010/main">
+        <mc:Choice Requires="a14">
           <p:sp>
             <p:nvSpPr>
               <p:cNvPr id="62" name="Rectangle: Rounded Corners 61">
@@ -8424,7 +8448,7 @@
             </p:txBody>
           </p:sp>
         </mc:Choice>
-        <mc:Fallback>
+        <mc:Fallback xmlns="">
           <p:sp>
             <p:nvSpPr>
               <p:cNvPr id="62" name="Rectangle: Rounded Corners 61">

</xml_diff>